<commit_message>
Final Deliverable with Screen Recording
</commit_message>
<xml_diff>
--- a/FinalSubmission/M5/3. Screen Recording/Design.pptx
+++ b/FinalSubmission/M5/3. Screen Recording/Design.pptx
@@ -5,10 +5,11 @@
     <p:sldMasterId id="2147483648" r:id="rId1"/>
   </p:sldMasterIdLst>
   <p:sldIdLst>
-    <p:sldId id="262" r:id="rId2"/>
-    <p:sldId id="263" r:id="rId3"/>
-    <p:sldId id="264" r:id="rId4"/>
-    <p:sldId id="265" r:id="rId5"/>
+    <p:sldId id="266" r:id="rId2"/>
+    <p:sldId id="262" r:id="rId3"/>
+    <p:sldId id="263" r:id="rId4"/>
+    <p:sldId id="264" r:id="rId5"/>
+    <p:sldId id="265" r:id="rId6"/>
   </p:sldIdLst>
   <p:sldSz cx="9144000" cy="6858000" type="screen4x3"/>
   <p:notesSz cx="6858000" cy="9144000"/>
@@ -305,7 +306,7 @@
           <a:p>
             <a:fld id="{5BCAD085-E8A6-8845-BD4E-CB4CCA059FC4}" type="datetimeFigureOut">
               <a:rPr lang="en-US" smtClean="0"/>
-              <a:t>8/4/2024</a:t>
+              <a:t>8/5/2024</a:t>
             </a:fld>
             <a:endParaRPr lang="en-US"/>
           </a:p>
@@ -473,7 +474,7 @@
           <a:p>
             <a:fld id="{5BCAD085-E8A6-8845-BD4E-CB4CCA059FC4}" type="datetimeFigureOut">
               <a:rPr lang="en-US" smtClean="0"/>
-              <a:t>8/4/2024</a:t>
+              <a:t>8/5/2024</a:t>
             </a:fld>
             <a:endParaRPr lang="en-US"/>
           </a:p>
@@ -651,7 +652,7 @@
           <a:p>
             <a:fld id="{5BCAD085-E8A6-8845-BD4E-CB4CCA059FC4}" type="datetimeFigureOut">
               <a:rPr lang="en-US" smtClean="0"/>
-              <a:t>8/4/2024</a:t>
+              <a:t>8/5/2024</a:t>
             </a:fld>
             <a:endParaRPr lang="en-US"/>
           </a:p>
@@ -819,7 +820,7 @@
           <a:p>
             <a:fld id="{5BCAD085-E8A6-8845-BD4E-CB4CCA059FC4}" type="datetimeFigureOut">
               <a:rPr lang="en-US" smtClean="0"/>
-              <a:t>8/4/2024</a:t>
+              <a:t>8/5/2024</a:t>
             </a:fld>
             <a:endParaRPr lang="en-US"/>
           </a:p>
@@ -1064,7 +1065,7 @@
           <a:p>
             <a:fld id="{5BCAD085-E8A6-8845-BD4E-CB4CCA059FC4}" type="datetimeFigureOut">
               <a:rPr lang="en-US" smtClean="0"/>
-              <a:t>8/4/2024</a:t>
+              <a:t>8/5/2024</a:t>
             </a:fld>
             <a:endParaRPr lang="en-US"/>
           </a:p>
@@ -1349,7 +1350,7 @@
           <a:p>
             <a:fld id="{5BCAD085-E8A6-8845-BD4E-CB4CCA059FC4}" type="datetimeFigureOut">
               <a:rPr lang="en-US" smtClean="0"/>
-              <a:t>8/4/2024</a:t>
+              <a:t>8/5/2024</a:t>
             </a:fld>
             <a:endParaRPr lang="en-US"/>
           </a:p>
@@ -1768,7 +1769,7 @@
           <a:p>
             <a:fld id="{5BCAD085-E8A6-8845-BD4E-CB4CCA059FC4}" type="datetimeFigureOut">
               <a:rPr lang="en-US" smtClean="0"/>
-              <a:t>8/4/2024</a:t>
+              <a:t>8/5/2024</a:t>
             </a:fld>
             <a:endParaRPr lang="en-US"/>
           </a:p>
@@ -1885,7 +1886,7 @@
           <a:p>
             <a:fld id="{5BCAD085-E8A6-8845-BD4E-CB4CCA059FC4}" type="datetimeFigureOut">
               <a:rPr lang="en-US" smtClean="0"/>
-              <a:t>8/4/2024</a:t>
+              <a:t>8/5/2024</a:t>
             </a:fld>
             <a:endParaRPr lang="en-US"/>
           </a:p>
@@ -1980,7 +1981,7 @@
           <a:p>
             <a:fld id="{5BCAD085-E8A6-8845-BD4E-CB4CCA059FC4}" type="datetimeFigureOut">
               <a:rPr lang="en-US" smtClean="0"/>
-              <a:t>8/4/2024</a:t>
+              <a:t>8/5/2024</a:t>
             </a:fld>
             <a:endParaRPr lang="en-US"/>
           </a:p>
@@ -2255,7 +2256,7 @@
           <a:p>
             <a:fld id="{5BCAD085-E8A6-8845-BD4E-CB4CCA059FC4}" type="datetimeFigureOut">
               <a:rPr lang="en-US" smtClean="0"/>
-              <a:t>8/4/2024</a:t>
+              <a:t>8/5/2024</a:t>
             </a:fld>
             <a:endParaRPr lang="en-US"/>
           </a:p>
@@ -2507,7 +2508,7 @@
           <a:p>
             <a:fld id="{5BCAD085-E8A6-8845-BD4E-CB4CCA059FC4}" type="datetimeFigureOut">
               <a:rPr lang="en-US" smtClean="0"/>
-              <a:t>8/4/2024</a:t>
+              <a:t>8/5/2024</a:t>
             </a:fld>
             <a:endParaRPr lang="en-US"/>
           </a:p>
@@ -2718,7 +2719,7 @@
           <a:p>
             <a:fld id="{5BCAD085-E8A6-8845-BD4E-CB4CCA059FC4}" type="datetimeFigureOut">
               <a:rPr lang="en-US" smtClean="0"/>
-              <a:t>8/4/2024</a:t>
+              <a:t>8/5/2024</a:t>
             </a:fld>
             <a:endParaRPr lang="en-US"/>
           </a:p>
@@ -3095,6 +3096,185 @@
       </p:grpSpPr>
       <p:sp>
         <p:nvSpPr>
+          <p:cNvPr id="3" name="Content Placeholder 2">
+            <a:extLst>
+              <a:ext uri="{FF2B5EF4-FFF2-40B4-BE49-F238E27FC236}">
+                <a16:creationId xmlns:a16="http://schemas.microsoft.com/office/drawing/2014/main" id="{C681C559-201C-7FBE-A958-768519796445}"/>
+              </a:ext>
+            </a:extLst>
+          </p:cNvPr>
+          <p:cNvSpPr>
+            <a:spLocks noGrp="1"/>
+          </p:cNvSpPr>
+          <p:nvPr>
+            <p:ph idx="1"/>
+          </p:nvPr>
+        </p:nvSpPr>
+        <p:spPr>
+          <a:xfrm>
+            <a:off x="457200" y="896816"/>
+            <a:ext cx="8229600" cy="4525963"/>
+          </a:xfrm>
+        </p:spPr>
+        <p:txBody>
+          <a:bodyPr>
+            <a:normAutofit/>
+          </a:bodyPr>
+          <a:lstStyle/>
+          <a:p>
+            <a:pPr marL="400050"/>
+            <a:r>
+              <a:rPr lang="en-US" sz="1600" dirty="0"/>
+              <a:t>GROUP NUMBER: 60</a:t>
+            </a:r>
+          </a:p>
+          <a:p>
+            <a:pPr marL="400050"/>
+            <a:r>
+              <a:rPr lang="en-US" sz="1600" dirty="0"/>
+              <a:t>GROUP MEMBERS:</a:t>
+            </a:r>
+          </a:p>
+          <a:p>
+            <a:pPr lvl="1">
+              <a:buFont typeface="Arial" panose="020B0604020202020204" pitchFamily="34" charset="0"/>
+              <a:buChar char="•"/>
+            </a:pPr>
+            <a:r>
+              <a:rPr lang="en-US" sz="1600" dirty="0"/>
+              <a:t>HIMANSHU AMODWALA (2022AC05442)</a:t>
+            </a:r>
+          </a:p>
+          <a:p>
+            <a:pPr lvl="1">
+              <a:buFont typeface="Arial" panose="020B0604020202020204" pitchFamily="34" charset="0"/>
+              <a:buChar char="•"/>
+            </a:pPr>
+            <a:r>
+              <a:rPr lang="en-IN" sz="1600" dirty="0"/>
+              <a:t>DIBYAJYOTI SARKAR (2022AA05005)</a:t>
+            </a:r>
+          </a:p>
+          <a:p>
+            <a:pPr lvl="1">
+              <a:buFont typeface="Arial" panose="020B0604020202020204" pitchFamily="34" charset="0"/>
+              <a:buChar char="•"/>
+            </a:pPr>
+            <a:r>
+              <a:rPr lang="en-IN" sz="1600" dirty="0"/>
+              <a:t>GULAM SARWAR (2022AC05156)</a:t>
+            </a:r>
+          </a:p>
+          <a:p>
+            <a:pPr lvl="1">
+              <a:buFont typeface="Arial" panose="020B0604020202020204" pitchFamily="34" charset="0"/>
+              <a:buChar char="•"/>
+            </a:pPr>
+            <a:r>
+              <a:rPr lang="en-IN" sz="1600" dirty="0"/>
+              <a:t>R SASIKUMAR (2022AC05474)</a:t>
+            </a:r>
+          </a:p>
+          <a:p>
+            <a:pPr lvl="1">
+              <a:buFont typeface="Arial" panose="020B0604020202020204" pitchFamily="34" charset="0"/>
+              <a:buChar char="•"/>
+            </a:pPr>
+            <a:r>
+              <a:rPr lang="en-IN" sz="1600" dirty="0">
+                <a:solidFill>
+                  <a:srgbClr val="FF0000"/>
+                </a:solidFill>
+              </a:rPr>
+              <a:t>AKASH SARKAR (2022AC05068) (0% Contribution)</a:t>
+            </a:r>
+          </a:p>
+        </p:txBody>
+      </p:sp>
+      <p:sp>
+        <p:nvSpPr>
+          <p:cNvPr id="4" name="Title 1">
+            <a:extLst>
+              <a:ext uri="{FF2B5EF4-FFF2-40B4-BE49-F238E27FC236}">
+                <a16:creationId xmlns:a16="http://schemas.microsoft.com/office/drawing/2014/main" id="{AAD388DB-8A65-3E25-03A6-576B92D6313E}"/>
+              </a:ext>
+            </a:extLst>
+          </p:cNvPr>
+          <p:cNvSpPr txBox="1">
+            <a:spLocks/>
+          </p:cNvSpPr>
+          <p:nvPr/>
+        </p:nvSpPr>
+        <p:spPr>
+          <a:xfrm>
+            <a:off x="457200" y="274638"/>
+            <a:ext cx="8229600" cy="460468"/>
+          </a:xfrm>
+          <a:prstGeom prst="rect">
+            <a:avLst/>
+          </a:prstGeom>
+        </p:spPr>
+        <p:txBody>
+          <a:bodyPr vert="horz" lIns="91440" tIns="45720" rIns="91440" bIns="45720" rtlCol="0" anchor="ctr">
+            <a:normAutofit fontScale="92500" lnSpcReduction="10000"/>
+          </a:bodyPr>
+          <a:lstStyle>
+            <a:lvl1pPr algn="ctr" defTabSz="457200" rtl="0" eaLnBrk="1" latinLnBrk="0" hangingPunct="1">
+              <a:spcBef>
+                <a:spcPct val="0"/>
+              </a:spcBef>
+              <a:buNone/>
+              <a:defRPr sz="4400" kern="1200">
+                <a:solidFill>
+                  <a:schemeClr val="tx1"/>
+                </a:solidFill>
+                <a:latin typeface="+mj-lt"/>
+                <a:ea typeface="+mj-ea"/>
+                <a:cs typeface="+mj-cs"/>
+              </a:defRPr>
+            </a:lvl1pPr>
+          </a:lstStyle>
+          <a:p>
+            <a:pPr algn="l"/>
+            <a:r>
+              <a:rPr lang="en-US" sz="2800" b="1" dirty="0"/>
+              <a:t>MLOps Assignment 1</a:t>
+            </a:r>
+          </a:p>
+        </p:txBody>
+      </p:sp>
+    </p:spTree>
+    <p:extLst>
+      <p:ext uri="{BB962C8B-B14F-4D97-AF65-F5344CB8AC3E}">
+        <p14:creationId xmlns:p14="http://schemas.microsoft.com/office/powerpoint/2010/main" val="3272116800"/>
+      </p:ext>
+    </p:extLst>
+  </p:cSld>
+  <p:clrMapOvr>
+    <a:masterClrMapping/>
+  </p:clrMapOvr>
+</p:sld>
+</file>
+
+<file path=ppt/slides/slide2.xml><?xml version="1.0" encoding="utf-8"?>
+<p:sld xmlns:a="http://schemas.openxmlformats.org/drawingml/2006/main" xmlns:r="http://schemas.openxmlformats.org/officeDocument/2006/relationships" xmlns:p="http://schemas.openxmlformats.org/presentationml/2006/main">
+  <p:cSld>
+    <p:spTree>
+      <p:nvGrpSpPr>
+        <p:cNvPr id="1" name=""/>
+        <p:cNvGrpSpPr/>
+        <p:nvPr/>
+      </p:nvGrpSpPr>
+      <p:grpSpPr>
+        <a:xfrm>
+          <a:off x="0" y="0"/>
+          <a:ext cx="0" cy="0"/>
+          <a:chOff x="0" y="0"/>
+          <a:chExt cx="0" cy="0"/>
+        </a:xfrm>
+      </p:grpSpPr>
+      <p:sp>
+        <p:nvSpPr>
           <p:cNvPr id="6" name="Title 1">
             <a:extLst>
               <a:ext uri="{FF2B5EF4-FFF2-40B4-BE49-F238E27FC236}">
@@ -4907,7 +5087,7 @@
 </p:sld>
 </file>
 
-<file path=ppt/slides/slide2.xml><?xml version="1.0" encoding="utf-8"?>
+<file path=ppt/slides/slide3.xml><?xml version="1.0" encoding="utf-8"?>
 <p:sld xmlns:a="http://schemas.openxmlformats.org/drawingml/2006/main" xmlns:r="http://schemas.openxmlformats.org/officeDocument/2006/relationships" xmlns:p="http://schemas.openxmlformats.org/presentationml/2006/main">
   <p:cSld>
     <p:spTree>
@@ -5997,7 +6177,7 @@
 </p:sld>
 </file>
 
-<file path=ppt/slides/slide3.xml><?xml version="1.0" encoding="utf-8"?>
+<file path=ppt/slides/slide4.xml><?xml version="1.0" encoding="utf-8"?>
 <p:sld xmlns:a="http://schemas.openxmlformats.org/drawingml/2006/main" xmlns:r="http://schemas.openxmlformats.org/officeDocument/2006/relationships" xmlns:p="http://schemas.openxmlformats.org/presentationml/2006/main">
   <p:cSld>
     <p:spTree>
@@ -7315,7 +7495,7 @@
 </p:sld>
 </file>
 
-<file path=ppt/slides/slide4.xml><?xml version="1.0" encoding="utf-8"?>
+<file path=ppt/slides/slide5.xml><?xml version="1.0" encoding="utf-8"?>
 <p:sld xmlns:a="http://schemas.openxmlformats.org/drawingml/2006/main" xmlns:r="http://schemas.openxmlformats.org/officeDocument/2006/relationships" xmlns:p="http://schemas.openxmlformats.org/presentationml/2006/main">
   <p:cSld>
     <p:spTree>

</xml_diff>